<commit_message>
ModelClassComponentClassDiagram.pptx: Update to reflect project
</commit_message>
<xml_diff>
--- a/docs/diagrams/ModelComponentClassDiagram.pptx
+++ b/docs/diagrams/ModelComponentClassDiagram.pptx
@@ -208,7 +208,7 @@
           <a:p>
             <a:fld id="{F5CC4B3F-88C1-4FFA-B1B6-F41C21DC6924}" type="datetimeFigureOut">
               <a:rPr lang="en-US" smtClean="0"/>
-              <a:t>6/27/2018</a:t>
+              <a:t>10/30/18</a:t>
             </a:fld>
             <a:endParaRPr lang="en-US"/>
           </a:p>
@@ -654,7 +654,7 @@
           <a:p>
             <a:fld id="{78C97017-6FC3-485B-9764-EAC9E56C1D49}" type="datetimeFigureOut">
               <a:rPr lang="en-US" smtClean="0"/>
-              <a:t>6/27/2018</a:t>
+              <a:t>10/30/18</a:t>
             </a:fld>
             <a:endParaRPr lang="en-US"/>
           </a:p>
@@ -822,7 +822,7 @@
           <a:p>
             <a:fld id="{78C97017-6FC3-485B-9764-EAC9E56C1D49}" type="datetimeFigureOut">
               <a:rPr lang="en-US" smtClean="0"/>
-              <a:t>6/27/2018</a:t>
+              <a:t>10/30/18</a:t>
             </a:fld>
             <a:endParaRPr lang="en-US"/>
           </a:p>
@@ -1000,7 +1000,7 @@
           <a:p>
             <a:fld id="{78C97017-6FC3-485B-9764-EAC9E56C1D49}" type="datetimeFigureOut">
               <a:rPr lang="en-US" smtClean="0"/>
-              <a:t>6/27/2018</a:t>
+              <a:t>10/30/18</a:t>
             </a:fld>
             <a:endParaRPr lang="en-US"/>
           </a:p>
@@ -1168,7 +1168,7 @@
           <a:p>
             <a:fld id="{78C97017-6FC3-485B-9764-EAC9E56C1D49}" type="datetimeFigureOut">
               <a:rPr lang="en-US" smtClean="0"/>
-              <a:t>6/27/2018</a:t>
+              <a:t>10/30/18</a:t>
             </a:fld>
             <a:endParaRPr lang="en-US"/>
           </a:p>
@@ -1413,7 +1413,7 @@
           <a:p>
             <a:fld id="{78C97017-6FC3-485B-9764-EAC9E56C1D49}" type="datetimeFigureOut">
               <a:rPr lang="en-US" smtClean="0"/>
-              <a:t>6/27/2018</a:t>
+              <a:t>10/30/18</a:t>
             </a:fld>
             <a:endParaRPr lang="en-US"/>
           </a:p>
@@ -1698,7 +1698,7 @@
           <a:p>
             <a:fld id="{78C97017-6FC3-485B-9764-EAC9E56C1D49}" type="datetimeFigureOut">
               <a:rPr lang="en-US" smtClean="0"/>
-              <a:t>6/27/2018</a:t>
+              <a:t>10/30/18</a:t>
             </a:fld>
             <a:endParaRPr lang="en-US"/>
           </a:p>
@@ -2117,7 +2117,7 @@
           <a:p>
             <a:fld id="{78C97017-6FC3-485B-9764-EAC9E56C1D49}" type="datetimeFigureOut">
               <a:rPr lang="en-US" smtClean="0"/>
-              <a:t>6/27/2018</a:t>
+              <a:t>10/30/18</a:t>
             </a:fld>
             <a:endParaRPr lang="en-US"/>
           </a:p>
@@ -2234,7 +2234,7 @@
           <a:p>
             <a:fld id="{78C97017-6FC3-485B-9764-EAC9E56C1D49}" type="datetimeFigureOut">
               <a:rPr lang="en-US" smtClean="0"/>
-              <a:t>6/27/2018</a:t>
+              <a:t>10/30/18</a:t>
             </a:fld>
             <a:endParaRPr lang="en-US"/>
           </a:p>
@@ -2329,7 +2329,7 @@
           <a:p>
             <a:fld id="{78C97017-6FC3-485B-9764-EAC9E56C1D49}" type="datetimeFigureOut">
               <a:rPr lang="en-US" smtClean="0"/>
-              <a:t>6/27/2018</a:t>
+              <a:t>10/30/18</a:t>
             </a:fld>
             <a:endParaRPr lang="en-US"/>
           </a:p>
@@ -2604,7 +2604,7 @@
           <a:p>
             <a:fld id="{78C97017-6FC3-485B-9764-EAC9E56C1D49}" type="datetimeFigureOut">
               <a:rPr lang="en-US" smtClean="0"/>
-              <a:t>6/27/2018</a:t>
+              <a:t>10/30/18</a:t>
             </a:fld>
             <a:endParaRPr lang="en-US"/>
           </a:p>
@@ -2856,7 +2856,7 @@
           <a:p>
             <a:fld id="{78C97017-6FC3-485B-9764-EAC9E56C1D49}" type="datetimeFigureOut">
               <a:rPr lang="en-US" smtClean="0"/>
-              <a:t>6/27/2018</a:t>
+              <a:t>10/30/18</a:t>
             </a:fld>
             <a:endParaRPr lang="en-US"/>
           </a:p>
@@ -3067,7 +3067,7 @@
           <a:p>
             <a:fld id="{78C97017-6FC3-485B-9764-EAC9E56C1D49}" type="datetimeFigureOut">
               <a:rPr lang="en-US" smtClean="0"/>
-              <a:t>6/27/2018</a:t>
+              <a:t>10/30/18</a:t>
             </a:fld>
             <a:endParaRPr lang="en-US"/>
           </a:p>
@@ -3450,8 +3450,8 @@
         </p:nvSpPr>
         <p:spPr>
           <a:xfrm>
-            <a:off x="1119865" y="1600200"/>
-            <a:ext cx="7490735" cy="3124200"/>
+            <a:off x="990600" y="1600200"/>
+            <a:ext cx="7848599" cy="4114800"/>
           </a:xfrm>
           <a:prstGeom prst="roundRect">
             <a:avLst>
@@ -3511,7 +3511,7 @@
         </p:nvSpPr>
         <p:spPr>
           <a:xfrm>
-            <a:off x="2877180" y="3463240"/>
+            <a:off x="3402165" y="3387040"/>
             <a:ext cx="1093635" cy="346760"/>
           </a:xfrm>
           <a:prstGeom prst="rect">
@@ -3552,7 +3552,7 @@
                   <a:schemeClr val="bg1"/>
                 </a:solidFill>
               </a:rPr>
-              <a:t>UserPref</a:t>
+              <a:t>UserPrefs</a:t>
             </a:r>
             <a:endParaRPr lang="en-SG" sz="1050" dirty="0">
               <a:solidFill>
@@ -3570,8 +3570,8 @@
         </p:nvSpPr>
         <p:spPr>
           <a:xfrm rot="16200000">
-            <a:off x="1661548" y="3097750"/>
-            <a:ext cx="1093635" cy="346760"/>
+            <a:off x="1368242" y="3319165"/>
+            <a:ext cx="1536465" cy="346760"/>
           </a:xfrm>
           <a:prstGeom prst="rect">
             <a:avLst/>
@@ -3627,18 +3627,18 @@
           <p:cNvCxnSpPr>
             <a:cxnSpLocks/>
             <a:stCxn id="9" idx="1"/>
-            <a:endCxn id="62" idx="2"/>
           </p:cNvCxnSpPr>
           <p:nvPr/>
         </p:nvCxnSpPr>
         <p:spPr>
           <a:xfrm rot="5400000" flipH="1" flipV="1">
-            <a:off x="4131507" y="1281685"/>
-            <a:ext cx="613122" cy="4459404"/>
-          </a:xfrm>
-          <a:prstGeom prst="bentConnector3">
+            <a:off x="3838201" y="1503100"/>
+            <a:ext cx="1055952" cy="4459404"/>
+          </a:xfrm>
+          <a:prstGeom prst="bentConnector4">
             <a:avLst>
-              <a:gd name="adj1" fmla="val -26668"/>
+              <a:gd name="adj1" fmla="val -57265"/>
+              <a:gd name="adj2" fmla="val 99955"/>
             </a:avLst>
           </a:prstGeom>
           <a:ln w="19050">
@@ -3674,7 +3674,7 @@
         </p:nvSpPr>
         <p:spPr>
           <a:xfrm rot="16200000">
-            <a:off x="956202" y="2861202"/>
+            <a:off x="884311" y="2861202"/>
             <a:ext cx="1093635" cy="346760"/>
           </a:xfrm>
           <a:prstGeom prst="rect">
@@ -3744,7 +3744,7 @@
         </p:nvSpPr>
         <p:spPr>
           <a:xfrm rot="16200000">
-            <a:off x="1626910" y="2952291"/>
+            <a:off x="1555019" y="2952291"/>
             <a:ext cx="270504" cy="175523"/>
           </a:xfrm>
           <a:prstGeom prst="triangle">
@@ -3787,6 +3787,7 @@
         <p:nvCxnSpPr>
           <p:cNvPr id="58" name="Straight Arrow Connector 57"/>
           <p:cNvCxnSpPr>
+            <a:cxnSpLocks/>
             <a:stCxn id="42" idx="3"/>
             <a:endCxn id="2" idx="1"/>
           </p:cNvCxnSpPr>
@@ -3794,8 +3795,8 @@
         </p:nvCxnSpPr>
         <p:spPr>
           <a:xfrm>
-            <a:off x="2609828" y="3636620"/>
-            <a:ext cx="267352" cy="0"/>
+            <a:off x="2555513" y="3555765"/>
+            <a:ext cx="846652" cy="4655"/>
           </a:xfrm>
           <a:prstGeom prst="straightConnector1">
             <a:avLst/>
@@ -3827,12 +3828,14 @@
       <p:cxnSp>
         <p:nvCxnSpPr>
           <p:cNvPr id="75" name="Elbow Connector 122"/>
-          <p:cNvCxnSpPr/>
+          <p:cNvCxnSpPr>
+            <a:cxnSpLocks/>
+          </p:cNvCxnSpPr>
           <p:nvPr/>
         </p:nvCxnSpPr>
         <p:spPr>
           <a:xfrm>
-            <a:off x="910091" y="3040053"/>
+            <a:off x="838200" y="3040053"/>
             <a:ext cx="419548" cy="2860"/>
           </a:xfrm>
           <a:prstGeom prst="bentConnector3">
@@ -3877,7 +3880,7 @@
         </p:nvCxnSpPr>
         <p:spPr>
           <a:xfrm flipV="1">
-            <a:off x="1849924" y="3040052"/>
+            <a:off x="1778033" y="3040052"/>
             <a:ext cx="216105" cy="1"/>
           </a:xfrm>
           <a:prstGeom prst="line">
@@ -3916,8 +3919,8 @@
         </p:nvSpPr>
         <p:spPr>
           <a:xfrm>
-            <a:off x="2373780" y="3549930"/>
-            <a:ext cx="236048" cy="173380"/>
+            <a:off x="2319465" y="3428999"/>
+            <a:ext cx="236048" cy="253532"/>
           </a:xfrm>
           <a:prstGeom prst="flowChartDecision">
             <a:avLst/>
@@ -3961,8 +3964,8 @@
         </p:nvSpPr>
         <p:spPr>
           <a:xfrm>
-            <a:off x="2825280" y="2846162"/>
-            <a:ext cx="1490560" cy="334856"/>
+            <a:off x="2740331" y="2846162"/>
+            <a:ext cx="1575509" cy="334856"/>
           </a:xfrm>
           <a:prstGeom prst="rect">
             <a:avLst/>
@@ -3994,12 +3997,12 @@
           <a:p>
             <a:pPr algn="ctr"/>
             <a:r>
-              <a:rPr lang="en-US" sz="1050" dirty="0" err="1" smtClean="0">
+              <a:rPr lang="en-US" sz="1050" dirty="0" err="1">
                 <a:solidFill>
                   <a:srgbClr val="7030A0"/>
                 </a:solidFill>
               </a:rPr>
-              <a:t>VersionedAddressBook</a:t>
+              <a:t>VersionedModulePlanner</a:t>
             </a:r>
             <a:endParaRPr lang="en-SG" sz="1050" dirty="0">
               <a:solidFill>
@@ -4013,6 +4016,7 @@
         <p:nvCxnSpPr>
           <p:cNvPr id="47" name="Straight Arrow Connector 46"/>
           <p:cNvCxnSpPr>
+            <a:cxnSpLocks/>
             <a:stCxn id="48" idx="3"/>
             <a:endCxn id="46" idx="1"/>
           </p:cNvCxnSpPr>
@@ -4020,8 +4024,8 @@
         </p:nvCxnSpPr>
         <p:spPr>
           <a:xfrm>
-            <a:off x="2624360" y="3003033"/>
-            <a:ext cx="200920" cy="10557"/>
+            <a:off x="2556492" y="3007222"/>
+            <a:ext cx="183839" cy="6368"/>
           </a:xfrm>
           <a:prstGeom prst="straightConnector1">
             <a:avLst/>
@@ -4058,7 +4062,7 @@
         </p:nvSpPr>
         <p:spPr>
           <a:xfrm>
-            <a:off x="2388312" y="2916343"/>
+            <a:off x="2320444" y="2920532"/>
             <a:ext cx="236048" cy="173380"/>
           </a:xfrm>
           <a:prstGeom prst="flowChartDecision">
@@ -4136,12 +4140,12 @@
           <a:p>
             <a:pPr algn="ctr"/>
             <a:r>
-              <a:rPr lang="en-US" sz="1050" dirty="0" err="1">
+              <a:rPr lang="en-US" sz="1050" dirty="0">
                 <a:solidFill>
                   <a:srgbClr val="7030A0"/>
                 </a:solidFill>
               </a:rPr>
-              <a:t>UniquePersonList</a:t>
+              <a:t>Semester</a:t>
             </a:r>
             <a:endParaRPr lang="en-SG" sz="1050" dirty="0">
               <a:solidFill>
@@ -4244,7 +4248,7 @@
                   <a:srgbClr val="7030A0"/>
                 </a:solidFill>
               </a:rPr>
-              <a:t>Person</a:t>
+              <a:t>Module</a:t>
             </a:r>
             <a:endParaRPr lang="en-SG" sz="1050" dirty="0">
               <a:solidFill>
@@ -4348,8 +4352,8 @@
         </p:nvSpPr>
         <p:spPr>
           <a:xfrm>
-            <a:off x="7712397" y="2564238"/>
-            <a:ext cx="708186" cy="285783"/>
+            <a:off x="7704296" y="2674228"/>
+            <a:ext cx="898204" cy="285783"/>
           </a:xfrm>
           <a:prstGeom prst="rect">
             <a:avLst/>
@@ -4381,12 +4385,12 @@
           <a:p>
             <a:pPr algn="ctr"/>
             <a:r>
-              <a:rPr lang="en-US" sz="1050" dirty="0">
+              <a:rPr lang="en-US" sz="1050" dirty="0" err="1">
                 <a:solidFill>
                   <a:srgbClr val="7030A0"/>
                 </a:solidFill>
               </a:rPr>
-              <a:t>Name</a:t>
+              <a:t>ModuleType</a:t>
             </a:r>
             <a:endParaRPr lang="en-SG" sz="1050" dirty="0">
               <a:solidFill>
@@ -4448,13 +4452,15 @@
           <p:cNvPr id="79" name="Elbow Connector 78"/>
           <p:cNvCxnSpPr>
             <a:cxnSpLocks/>
+            <a:stCxn id="78" idx="3"/>
+            <a:endCxn id="76" idx="1"/>
           </p:cNvCxnSpPr>
           <p:nvPr/>
         </p:nvCxnSpPr>
         <p:spPr>
           <a:xfrm flipV="1">
-            <a:off x="7277995" y="2706821"/>
-            <a:ext cx="434402" cy="327761"/>
+            <a:off x="7277995" y="2817120"/>
+            <a:ext cx="426301" cy="217771"/>
           </a:xfrm>
           <a:prstGeom prst="bentConnector3">
             <a:avLst/>
@@ -4491,8 +4497,8 @@
         </p:nvSpPr>
         <p:spPr>
           <a:xfrm>
-            <a:off x="7712397" y="2887216"/>
-            <a:ext cx="708186" cy="285783"/>
+            <a:off x="7704297" y="3069694"/>
+            <a:ext cx="898203" cy="285783"/>
           </a:xfrm>
           <a:prstGeom prst="rect">
             <a:avLst/>
@@ -4529,9 +4535,17 @@
                   <a:srgbClr val="7030A0"/>
                 </a:solidFill>
               </a:rPr>
-              <a:t>Phone</a:t>
-            </a:r>
-            <a:endParaRPr lang="en-SG" sz="1050" dirty="0">
+              <a:t>Module</a:t>
+            </a:r>
+            <a:r>
+              <a:rPr lang="en-SG" sz="1050" dirty="0">
+                <a:solidFill>
+                  <a:srgbClr val="7030A0"/>
+                </a:solidFill>
+              </a:rPr>
+              <a:t>Info</a:t>
+            </a:r>
+            <a:endParaRPr lang="en-US" sz="1050" dirty="0">
               <a:solidFill>
                 <a:srgbClr val="7030A0"/>
               </a:solidFill>
@@ -4543,15 +4557,16 @@
         <p:nvCxnSpPr>
           <p:cNvPr id="81" name="Elbow Connector 80"/>
           <p:cNvCxnSpPr>
+            <a:cxnSpLocks/>
             <a:stCxn id="78" idx="3"/>
             <a:endCxn id="80" idx="1"/>
           </p:cNvCxnSpPr>
           <p:nvPr/>
         </p:nvCxnSpPr>
         <p:spPr>
-          <a:xfrm flipV="1">
-            <a:off x="7277995" y="3030108"/>
-            <a:ext cx="434402" cy="4783"/>
+          <a:xfrm>
+            <a:off x="7277995" y="3034891"/>
+            <a:ext cx="426302" cy="177695"/>
           </a:xfrm>
           <a:prstGeom prst="bentConnector3">
             <a:avLst/>
@@ -4582,16 +4597,16 @@
       </p:cxnSp>
       <p:sp>
         <p:nvSpPr>
-          <p:cNvPr id="83" name="Rectangle 8"/>
+          <p:cNvPr id="99" name="Isosceles Triangle 102"/>
           <p:cNvSpPr/>
           <p:nvPr/>
         </p:nvSpPr>
         <p:spPr>
-          <a:xfrm>
-            <a:off x="7712397" y="3210194"/>
-            <a:ext cx="708186" cy="285783"/>
-          </a:xfrm>
-          <a:prstGeom prst="rect">
+          <a:xfrm rot="10800000" flipV="1">
+            <a:off x="3584729" y="2365338"/>
+            <a:ext cx="282387" cy="157062"/>
+          </a:xfrm>
+          <a:prstGeom prst="triangle">
             <a:avLst/>
           </a:prstGeom>
           <a:ln w="19050">
@@ -4620,43 +4635,218 @@
           <a:lstStyle/>
           <a:p>
             <a:pPr algn="ctr"/>
-            <a:r>
-              <a:rPr lang="en-US" sz="1050" dirty="0">
-                <a:solidFill>
-                  <a:srgbClr val="7030A0"/>
-                </a:solidFill>
-              </a:rPr>
-              <a:t>Email</a:t>
-            </a:r>
-            <a:endParaRPr lang="en-SG" sz="1050" dirty="0">
+            <a:endParaRPr lang="en-SG" sz="1050" b="1">
               <a:solidFill>
-                <a:srgbClr val="7030A0"/>
+                <a:srgbClr val="92D050"/>
               </a:solidFill>
             </a:endParaRPr>
           </a:p>
         </p:txBody>
       </p:sp>
-      <p:cxnSp>
-        <p:nvCxnSpPr>
-          <p:cNvPr id="84" name="Elbow Connector 83"/>
-          <p:cNvCxnSpPr>
-            <a:stCxn id="78" idx="3"/>
-            <a:endCxn id="83" idx="1"/>
-          </p:cNvCxnSpPr>
+      <p:sp>
+        <p:nvSpPr>
+          <p:cNvPr id="100" name="Rectangle 8"/>
+          <p:cNvSpPr/>
           <p:nvPr/>
-        </p:nvCxnSpPr>
+        </p:nvSpPr>
         <p:spPr>
           <a:xfrm>
-            <a:off x="7277995" y="3034891"/>
-            <a:ext cx="434402" cy="318195"/>
-          </a:xfrm>
-          <a:prstGeom prst="bentConnector3">
+            <a:off x="1119866" y="1998350"/>
+            <a:ext cx="1584718" cy="364396"/>
+          </a:xfrm>
+          <a:prstGeom prst="rect">
             <a:avLst/>
           </a:prstGeom>
           <a:ln w="19050">
             <a:solidFill>
               <a:srgbClr val="7030A0"/>
             </a:solidFill>
+          </a:ln>
+          <a:effectLst/>
+        </p:spPr>
+        <p:style>
+          <a:lnRef idx="1">
+            <a:schemeClr val="accent4"/>
+          </a:lnRef>
+          <a:fillRef idx="2">
+            <a:schemeClr val="accent4"/>
+          </a:fillRef>
+          <a:effectRef idx="1">
+            <a:schemeClr val="accent4"/>
+          </a:effectRef>
+          <a:fontRef idx="minor">
+            <a:schemeClr val="dk1"/>
+          </a:fontRef>
+        </p:style>
+        <p:txBody>
+          <a:bodyPr rtlCol="0" anchor="ctr"/>
+          <a:lstStyle/>
+          <a:p>
+            <a:pPr algn="ctr"/>
+            <a:r>
+              <a:rPr lang="en-US" sz="1050" dirty="0">
+                <a:solidFill>
+                  <a:srgbClr val="7030A0"/>
+                </a:solidFill>
+              </a:rPr>
+              <a:t>&lt;&lt;interface&gt;&gt;</a:t>
+            </a:r>
+            <a:br>
+              <a:rPr lang="en-US" sz="1050" dirty="0">
+                <a:solidFill>
+                  <a:srgbClr val="7030A0"/>
+                </a:solidFill>
+              </a:rPr>
+            </a:br>
+            <a:r>
+              <a:rPr lang="en-US" sz="1050" dirty="0" err="1">
+                <a:solidFill>
+                  <a:srgbClr val="7030A0"/>
+                </a:solidFill>
+              </a:rPr>
+              <a:t>ReadOnlyModulePlanner</a:t>
+            </a:r>
+            <a:endParaRPr lang="en-SG" sz="1050" dirty="0">
+              <a:solidFill>
+                <a:srgbClr val="7030A0"/>
+              </a:solidFill>
+            </a:endParaRPr>
+          </a:p>
+        </p:txBody>
+      </p:sp>
+      <p:sp>
+        <p:nvSpPr>
+          <p:cNvPr id="114" name="TextBox 113"/>
+          <p:cNvSpPr txBox="1"/>
+          <p:nvPr/>
+        </p:nvSpPr>
+        <p:spPr>
+          <a:xfrm rot="16200000">
+            <a:off x="6615108" y="3643308"/>
+            <a:ext cx="376574" cy="261610"/>
+          </a:xfrm>
+          <a:prstGeom prst="rect">
+            <a:avLst/>
+          </a:prstGeom>
+          <a:noFill/>
+        </p:spPr>
+        <p:txBody>
+          <a:bodyPr wrap="square" rtlCol="0">
+            <a:spAutoFit/>
+          </a:bodyPr>
+          <a:lstStyle/>
+          <a:p>
+            <a:pPr algn="r"/>
+            <a:r>
+              <a:rPr lang="en-US" sz="1100" dirty="0">
+                <a:solidFill>
+                  <a:srgbClr val="7030A0"/>
+                </a:solidFill>
+              </a:rPr>
+              <a:t>list</a:t>
+            </a:r>
+            <a:endParaRPr lang="en-SG" sz="1100" dirty="0">
+              <a:solidFill>
+                <a:srgbClr val="7030A0"/>
+              </a:solidFill>
+            </a:endParaRPr>
+          </a:p>
+        </p:txBody>
+      </p:sp>
+      <p:sp>
+        <p:nvSpPr>
+          <p:cNvPr id="122" name="Rectangle 8"/>
+          <p:cNvSpPr/>
+          <p:nvPr/>
+        </p:nvSpPr>
+        <p:spPr>
+          <a:xfrm>
+            <a:off x="2057401" y="5063440"/>
+            <a:ext cx="1066800" cy="346760"/>
+          </a:xfrm>
+          <a:prstGeom prst="rect">
+            <a:avLst/>
+          </a:prstGeom>
+          <a:ln w="19050">
+            <a:solidFill>
+              <a:srgbClr val="7030A0"/>
+            </a:solidFill>
+          </a:ln>
+          <a:effectLst/>
+        </p:spPr>
+        <p:style>
+          <a:lnRef idx="1">
+            <a:schemeClr val="accent4"/>
+          </a:lnRef>
+          <a:fillRef idx="2">
+            <a:schemeClr val="accent4"/>
+          </a:fillRef>
+          <a:effectRef idx="1">
+            <a:schemeClr val="accent4"/>
+          </a:effectRef>
+          <a:fontRef idx="minor">
+            <a:schemeClr val="dk1"/>
+          </a:fontRef>
+        </p:style>
+        <p:txBody>
+          <a:bodyPr rtlCol="0" anchor="ctr"/>
+          <a:lstStyle/>
+          <a:p>
+            <a:pPr algn="ctr"/>
+            <a:r>
+              <a:rPr lang="en-US" sz="1050" dirty="0">
+                <a:solidFill>
+                  <a:srgbClr val="7030A0"/>
+                </a:solidFill>
+              </a:rPr>
+              <a:t>&lt;&lt;interface&gt;&gt;</a:t>
+            </a:r>
+            <a:br>
+              <a:rPr lang="en-US" sz="1050" dirty="0">
+                <a:solidFill>
+                  <a:srgbClr val="7030A0"/>
+                </a:solidFill>
+              </a:rPr>
+            </a:br>
+            <a:r>
+              <a:rPr lang="en-US" sz="1050" dirty="0" err="1">
+                <a:solidFill>
+                  <a:srgbClr val="7030A0"/>
+                </a:solidFill>
+              </a:rPr>
+              <a:t>ObservableList</a:t>
+            </a:r>
+            <a:endParaRPr lang="en-SG" sz="1050" dirty="0">
+              <a:solidFill>
+                <a:srgbClr val="7030A0"/>
+              </a:solidFill>
+            </a:endParaRPr>
+          </a:p>
+        </p:txBody>
+      </p:sp>
+      <p:cxnSp>
+        <p:nvCxnSpPr>
+          <p:cNvPr id="124" name="Elbow Connector 122"/>
+          <p:cNvCxnSpPr>
+            <a:cxnSpLocks/>
+            <a:stCxn id="119" idx="1"/>
+            <a:endCxn id="122" idx="1"/>
+          </p:cNvCxnSpPr>
+          <p:nvPr/>
+        </p:nvCxnSpPr>
+        <p:spPr>
+          <a:xfrm rot="16200000" flipH="1">
+            <a:off x="916555" y="4095974"/>
+            <a:ext cx="1655420" cy="626272"/>
+          </a:xfrm>
+          <a:prstGeom prst="bentConnector2">
+            <a:avLst/>
+          </a:prstGeom>
+          <a:ln w="19050">
+            <a:solidFill>
+              <a:srgbClr val="7030A0"/>
+            </a:solidFill>
+            <a:prstDash val="sysDot"/>
             <a:headEnd type="none" w="med" len="med"/>
             <a:tailEnd type="arrow" w="med" len="med"/>
           </a:ln>
@@ -4679,14 +4869,209 @@
       </p:cxnSp>
       <p:sp>
         <p:nvSpPr>
-          <p:cNvPr id="85" name="Rectangle 8"/>
+          <p:cNvPr id="54" name="TextBox 53"/>
+          <p:cNvSpPr txBox="1"/>
+          <p:nvPr/>
+        </p:nvSpPr>
+        <p:spPr>
+          <a:xfrm>
+            <a:off x="4429979" y="3111479"/>
+            <a:ext cx="189257" cy="178683"/>
+          </a:xfrm>
+          <a:prstGeom prst="rect">
+            <a:avLst/>
+          </a:prstGeom>
+          <a:noFill/>
+        </p:spPr>
+        <p:txBody>
+          <a:bodyPr wrap="square" lIns="0" tIns="0" rIns="0" bIns="0" rtlCol="0">
+            <a:noAutofit/>
+          </a:bodyPr>
+          <a:lstStyle/>
+          <a:p>
+            <a:pPr algn="ctr"/>
+            <a:r>
+              <a:rPr lang="en-US" sz="1100" dirty="0">
+                <a:solidFill>
+                  <a:srgbClr val="7030A0"/>
+                </a:solidFill>
+              </a:rPr>
+              <a:t>8</a:t>
+            </a:r>
+            <a:endParaRPr lang="en-SG" sz="1100" dirty="0">
+              <a:solidFill>
+                <a:srgbClr val="7030A0"/>
+              </a:solidFill>
+            </a:endParaRPr>
+          </a:p>
+        </p:txBody>
+      </p:sp>
+      <p:sp>
+        <p:nvSpPr>
+          <p:cNvPr id="61" name="TextBox 60"/>
+          <p:cNvSpPr txBox="1"/>
+          <p:nvPr/>
+        </p:nvSpPr>
+        <p:spPr>
+          <a:xfrm>
+            <a:off x="6135256" y="3097917"/>
+            <a:ext cx="189257" cy="178683"/>
+          </a:xfrm>
+          <a:prstGeom prst="rect">
+            <a:avLst/>
+          </a:prstGeom>
+          <a:noFill/>
+        </p:spPr>
+        <p:txBody>
+          <a:bodyPr wrap="square" lIns="0" tIns="0" rIns="0" bIns="0" rtlCol="0">
+            <a:noAutofit/>
+          </a:bodyPr>
+          <a:lstStyle/>
+          <a:p>
+            <a:pPr algn="ctr"/>
+            <a:r>
+              <a:rPr lang="en-US" sz="1100" dirty="0">
+                <a:solidFill>
+                  <a:srgbClr val="7030A0"/>
+                </a:solidFill>
+              </a:rPr>
+              <a:t>*</a:t>
+            </a:r>
+            <a:endParaRPr lang="en-SG" sz="1100" dirty="0">
+              <a:solidFill>
+                <a:srgbClr val="7030A0"/>
+              </a:solidFill>
+            </a:endParaRPr>
+          </a:p>
+        </p:txBody>
+      </p:sp>
+      <p:sp>
+        <p:nvSpPr>
+          <p:cNvPr id="65" name="TextBox 64"/>
+          <p:cNvSpPr txBox="1"/>
+          <p:nvPr/>
+        </p:nvSpPr>
+        <p:spPr>
+          <a:xfrm>
+            <a:off x="2573394" y="2756715"/>
+            <a:ext cx="170110" cy="137542"/>
+          </a:xfrm>
+          <a:prstGeom prst="rect">
+            <a:avLst/>
+          </a:prstGeom>
+          <a:noFill/>
+        </p:spPr>
+        <p:txBody>
+          <a:bodyPr wrap="square" lIns="0" tIns="0" rIns="0" bIns="0" rtlCol="0">
+            <a:noAutofit/>
+          </a:bodyPr>
+          <a:lstStyle/>
+          <a:p>
+            <a:pPr algn="ctr"/>
+            <a:r>
+              <a:rPr lang="en-US" sz="1100" dirty="0">
+                <a:solidFill>
+                  <a:srgbClr val="7030A0"/>
+                </a:solidFill>
+              </a:rPr>
+              <a:t>1</a:t>
+            </a:r>
+            <a:endParaRPr lang="en-SG" sz="1100" dirty="0">
+              <a:solidFill>
+                <a:srgbClr val="7030A0"/>
+              </a:solidFill>
+            </a:endParaRPr>
+          </a:p>
+        </p:txBody>
+      </p:sp>
+      <p:sp>
+        <p:nvSpPr>
+          <p:cNvPr id="66" name="TextBox 65"/>
+          <p:cNvSpPr txBox="1"/>
+          <p:nvPr/>
+        </p:nvSpPr>
+        <p:spPr>
+          <a:xfrm>
+            <a:off x="2571096" y="3355477"/>
+            <a:ext cx="189257" cy="178683"/>
+          </a:xfrm>
+          <a:prstGeom prst="rect">
+            <a:avLst/>
+          </a:prstGeom>
+          <a:noFill/>
+        </p:spPr>
+        <p:txBody>
+          <a:bodyPr wrap="square" lIns="0" tIns="0" rIns="0" bIns="0" rtlCol="0">
+            <a:noAutofit/>
+          </a:bodyPr>
+          <a:lstStyle/>
+          <a:p>
+            <a:pPr algn="ctr"/>
+            <a:r>
+              <a:rPr lang="en-US" sz="1100" dirty="0">
+                <a:solidFill>
+                  <a:srgbClr val="7030A0"/>
+                </a:solidFill>
+              </a:rPr>
+              <a:t>1</a:t>
+            </a:r>
+            <a:endParaRPr lang="en-SG" sz="1100" dirty="0">
+              <a:solidFill>
+                <a:srgbClr val="7030A0"/>
+              </a:solidFill>
+            </a:endParaRPr>
+          </a:p>
+        </p:txBody>
+      </p:sp>
+      <p:sp>
+        <p:nvSpPr>
+          <p:cNvPr id="70" name="TextBox 69"/>
+          <p:cNvSpPr txBox="1"/>
+          <p:nvPr/>
+        </p:nvSpPr>
+        <p:spPr>
+          <a:xfrm>
+            <a:off x="6400800" y="3204826"/>
+            <a:ext cx="189257" cy="178683"/>
+          </a:xfrm>
+          <a:prstGeom prst="rect">
+            <a:avLst/>
+          </a:prstGeom>
+          <a:noFill/>
+        </p:spPr>
+        <p:txBody>
+          <a:bodyPr wrap="square" lIns="0" tIns="0" rIns="0" bIns="0" rtlCol="0">
+            <a:noAutofit/>
+          </a:bodyPr>
+          <a:lstStyle/>
+          <a:p>
+            <a:pPr algn="ctr"/>
+            <a:r>
+              <a:rPr lang="en-US" sz="1100" dirty="0">
+                <a:solidFill>
+                  <a:srgbClr val="7030A0"/>
+                </a:solidFill>
+              </a:rPr>
+              <a:t>1</a:t>
+            </a:r>
+            <a:endParaRPr lang="en-SG" sz="1100" dirty="0">
+              <a:solidFill>
+                <a:srgbClr val="7030A0"/>
+              </a:solidFill>
+            </a:endParaRPr>
+          </a:p>
+        </p:txBody>
+      </p:sp>
+      <p:sp>
+        <p:nvSpPr>
+          <p:cNvPr id="55" name="Rectangle 8"/>
           <p:cNvSpPr/>
           <p:nvPr/>
         </p:nvSpPr>
         <p:spPr>
           <a:xfrm>
-            <a:off x="7712397" y="3533171"/>
-            <a:ext cx="708186" cy="285783"/>
+            <a:off x="3170181" y="1998350"/>
+            <a:ext cx="1060683" cy="364396"/>
           </a:xfrm>
           <a:prstGeom prst="rect">
             <a:avLst/>
@@ -4718,12 +5103,12 @@
           <a:p>
             <a:pPr algn="ctr"/>
             <a:r>
-              <a:rPr lang="en-US" sz="1050" dirty="0">
+              <a:rPr lang="en-US" sz="1050" dirty="0" err="1">
                 <a:solidFill>
                   <a:srgbClr val="7030A0"/>
                 </a:solidFill>
               </a:rPr>
-              <a:t>Address</a:t>
+              <a:t>ModulePlanner</a:t>
             </a:r>
             <a:endParaRPr lang="en-SG" sz="1050" dirty="0">
               <a:solidFill>
@@ -4735,19 +5120,19 @@
       </p:sp>
       <p:cxnSp>
         <p:nvCxnSpPr>
-          <p:cNvPr id="86" name="Elbow Connector 85"/>
+          <p:cNvPr id="60" name="Straight Arrow Connector 59"/>
           <p:cNvCxnSpPr>
-            <a:stCxn id="78" idx="3"/>
-            <a:endCxn id="85" idx="1"/>
+            <a:stCxn id="51" idx="1"/>
+            <a:endCxn id="49" idx="1"/>
           </p:cNvCxnSpPr>
           <p:nvPr/>
         </p:nvCxnSpPr>
         <p:spPr>
           <a:xfrm>
-            <a:off x="7277995" y="3034891"/>
-            <a:ext cx="434402" cy="641172"/>
-          </a:xfrm>
-          <a:prstGeom prst="bentConnector3">
+            <a:off x="4324972" y="3007222"/>
+            <a:ext cx="367678" cy="12320"/>
+          </a:xfrm>
+          <a:prstGeom prst="straightConnector1">
             <a:avLst/>
           </a:prstGeom>
           <a:ln w="19050">
@@ -4756,6 +5141,102 @@
             </a:solidFill>
             <a:headEnd type="none" w="med" len="med"/>
             <a:tailEnd type="arrow" w="med" len="med"/>
+          </a:ln>
+          <a:effectLst/>
+        </p:spPr>
+        <p:style>
+          <a:lnRef idx="1">
+            <a:schemeClr val="accent2"/>
+          </a:lnRef>
+          <a:fillRef idx="2">
+            <a:schemeClr val="accent2"/>
+          </a:fillRef>
+          <a:effectRef idx="1">
+            <a:schemeClr val="accent2"/>
+          </a:effectRef>
+          <a:fontRef idx="minor">
+            <a:schemeClr val="dk1"/>
+          </a:fontRef>
+        </p:style>
+      </p:cxnSp>
+      <p:sp>
+        <p:nvSpPr>
+          <p:cNvPr id="68" name="Isosceles Triangle 102"/>
+          <p:cNvSpPr/>
+          <p:nvPr/>
+        </p:nvSpPr>
+        <p:spPr>
+          <a:xfrm rot="16200000">
+            <a:off x="2669073" y="2069158"/>
+            <a:ext cx="271014" cy="187417"/>
+          </a:xfrm>
+          <a:prstGeom prst="triangle">
+            <a:avLst>
+              <a:gd name="adj" fmla="val 44517"/>
+            </a:avLst>
+          </a:prstGeom>
+          <a:solidFill>
+            <a:schemeClr val="accent4">
+              <a:lumMod val="20000"/>
+              <a:lumOff val="80000"/>
+            </a:schemeClr>
+          </a:solidFill>
+          <a:ln w="19050">
+            <a:solidFill>
+              <a:srgbClr val="7030A0"/>
+            </a:solidFill>
+          </a:ln>
+          <a:effectLst/>
+        </p:spPr>
+        <p:style>
+          <a:lnRef idx="1">
+            <a:schemeClr val="accent6"/>
+          </a:lnRef>
+          <a:fillRef idx="2">
+            <a:schemeClr val="accent6"/>
+          </a:fillRef>
+          <a:effectRef idx="1">
+            <a:schemeClr val="accent6"/>
+          </a:effectRef>
+          <a:fontRef idx="minor">
+            <a:schemeClr val="dk1"/>
+          </a:fontRef>
+        </p:style>
+        <p:txBody>
+          <a:bodyPr rtlCol="0" anchor="ctr"/>
+          <a:lstStyle/>
+          <a:p>
+            <a:pPr algn="ctr"/>
+            <a:endParaRPr lang="en-SG" sz="1050"/>
+          </a:p>
+        </p:txBody>
+      </p:sp>
+      <p:cxnSp>
+        <p:nvCxnSpPr>
+          <p:cNvPr id="69" name="Elbow Connector 63"/>
+          <p:cNvCxnSpPr>
+            <a:stCxn id="68" idx="3"/>
+            <a:endCxn id="55" idx="1"/>
+          </p:cNvCxnSpPr>
+          <p:nvPr/>
+        </p:nvCxnSpPr>
+        <p:spPr>
+          <a:xfrm>
+            <a:off x="2898289" y="2177727"/>
+            <a:ext cx="271892" cy="2821"/>
+          </a:xfrm>
+          <a:prstGeom prst="bentConnector3">
+            <a:avLst>
+              <a:gd name="adj1" fmla="val 50000"/>
+            </a:avLst>
+          </a:prstGeom>
+          <a:ln w="19050">
+            <a:solidFill>
+              <a:srgbClr val="7030A0"/>
+            </a:solidFill>
+            <a:prstDash val="sysDot"/>
+            <a:headEnd type="none" w="med" len="med"/>
+            <a:tailEnd type="none" w="med" len="med"/>
           </a:ln>
           <a:effectLst/>
         </p:spPr>
@@ -4776,16 +5257,63 @@
       </p:cxnSp>
       <p:cxnSp>
         <p:nvCxnSpPr>
-          <p:cNvPr id="97" name="Elbow Connector 63"/>
+          <p:cNvPr id="6" name="Straight Connector 5">
+            <a:extLst>
+              <a:ext uri="{FF2B5EF4-FFF2-40B4-BE49-F238E27FC236}">
+                <a16:creationId xmlns:a16="http://schemas.microsoft.com/office/drawing/2014/main" id="{DF893AE4-35E7-CE47-8F33-891363DD6BC9}"/>
+              </a:ext>
+            </a:extLst>
+          </p:cNvPr>
           <p:cNvCxnSpPr>
-            <a:stCxn id="99" idx="3"/>
+            <a:cxnSpLocks/>
           </p:cNvCxnSpPr>
           <p:nvPr/>
         </p:nvCxnSpPr>
         <p:spPr>
-          <a:xfrm rot="5400000">
-            <a:off x="3553611" y="2687559"/>
-            <a:ext cx="293825" cy="5938"/>
+          <a:xfrm flipV="1">
+            <a:off x="3725922" y="2529584"/>
+            <a:ext cx="0" cy="316578"/>
+          </a:xfrm>
+          <a:prstGeom prst="line">
+            <a:avLst/>
+          </a:prstGeom>
+          <a:ln w="19050"/>
+        </p:spPr>
+        <p:style>
+          <a:lnRef idx="1">
+            <a:schemeClr val="accent4"/>
+          </a:lnRef>
+          <a:fillRef idx="0">
+            <a:schemeClr val="accent4"/>
+          </a:fillRef>
+          <a:effectRef idx="0">
+            <a:schemeClr val="accent4"/>
+          </a:effectRef>
+          <a:fontRef idx="minor">
+            <a:schemeClr val="tx1"/>
+          </a:fontRef>
+        </p:style>
+      </p:cxnSp>
+      <p:cxnSp>
+        <p:nvCxnSpPr>
+          <p:cNvPr id="56" name="Straight Arrow Connector 55">
+            <a:extLst>
+              <a:ext uri="{FF2B5EF4-FFF2-40B4-BE49-F238E27FC236}">
+                <a16:creationId xmlns:a16="http://schemas.microsoft.com/office/drawing/2014/main" id="{DA9C463C-B97A-DE41-A79E-19F2D0208B3E}"/>
+              </a:ext>
+            </a:extLst>
+          </p:cNvPr>
+          <p:cNvCxnSpPr>
+            <a:cxnSpLocks/>
+            <a:stCxn id="72" idx="3"/>
+            <a:endCxn id="67" idx="1"/>
+          </p:cNvCxnSpPr>
+          <p:nvPr/>
+        </p:nvCxnSpPr>
+        <p:spPr>
+          <a:xfrm>
+            <a:off x="2562581" y="4084708"/>
+            <a:ext cx="839584" cy="3950"/>
           </a:xfrm>
           <a:prstGeom prst="bentConnector3">
             <a:avLst>
@@ -4796,9 +5324,8 @@
             <a:solidFill>
               <a:srgbClr val="7030A0"/>
             </a:solidFill>
-            <a:prstDash val="sysDot"/>
             <a:headEnd type="none" w="med" len="med"/>
-            <a:tailEnd type="none" w="med" len="med"/>
+            <a:tailEnd type="arrow" w="med" len="med"/>
           </a:ln>
           <a:effectLst/>
         </p:spPr>
@@ -4819,265 +5346,31 @@
       </p:cxnSp>
       <p:sp>
         <p:nvSpPr>
-          <p:cNvPr id="99" name="Isosceles Triangle 102"/>
+          <p:cNvPr id="67" name="Rectangle 8">
+            <a:extLst>
+              <a:ext uri="{FF2B5EF4-FFF2-40B4-BE49-F238E27FC236}">
+                <a16:creationId xmlns:a16="http://schemas.microsoft.com/office/drawing/2014/main" id="{EBFC5EEA-403C-F040-963F-ED84150724A4}"/>
+              </a:ext>
+            </a:extLst>
+          </p:cNvPr>
           <p:cNvSpPr/>
           <p:nvPr/>
         </p:nvSpPr>
         <p:spPr>
-          <a:xfrm rot="10800000" flipV="1">
-            <a:off x="3562299" y="2386554"/>
-            <a:ext cx="282387" cy="157062"/>
-          </a:xfrm>
-          <a:prstGeom prst="triangle">
+          <a:xfrm>
+            <a:off x="3402165" y="3915278"/>
+            <a:ext cx="1093635" cy="346760"/>
+          </a:xfrm>
+          <a:prstGeom prst="rect">
             <a:avLst/>
           </a:prstGeom>
+          <a:solidFill>
+            <a:srgbClr val="7030A0"/>
+          </a:solidFill>
           <a:ln w="19050">
             <a:solidFill>
               <a:srgbClr val="7030A0"/>
             </a:solidFill>
-          </a:ln>
-          <a:effectLst/>
-        </p:spPr>
-        <p:style>
-          <a:lnRef idx="1">
-            <a:schemeClr val="accent4"/>
-          </a:lnRef>
-          <a:fillRef idx="2">
-            <a:schemeClr val="accent4"/>
-          </a:fillRef>
-          <a:effectRef idx="1">
-            <a:schemeClr val="accent4"/>
-          </a:effectRef>
-          <a:fontRef idx="minor">
-            <a:schemeClr val="dk1"/>
-          </a:fontRef>
-        </p:style>
-        <p:txBody>
-          <a:bodyPr rtlCol="0" anchor="ctr"/>
-          <a:lstStyle/>
-          <a:p>
-            <a:pPr algn="ctr"/>
-            <a:endParaRPr lang="en-SG" sz="1050" b="1">
-              <a:solidFill>
-                <a:srgbClr val="92D050"/>
-              </a:solidFill>
-            </a:endParaRPr>
-          </a:p>
-        </p:txBody>
-      </p:sp>
-      <p:sp>
-        <p:nvSpPr>
-          <p:cNvPr id="100" name="Rectangle 8"/>
-          <p:cNvSpPr/>
-          <p:nvPr/>
-        </p:nvSpPr>
-        <p:spPr>
-          <a:xfrm>
-            <a:off x="1260922" y="1998350"/>
-            <a:ext cx="1443661" cy="364396"/>
-          </a:xfrm>
-          <a:prstGeom prst="rect">
-            <a:avLst/>
-          </a:prstGeom>
-          <a:ln w="19050">
-            <a:solidFill>
-              <a:srgbClr val="7030A0"/>
-            </a:solidFill>
-          </a:ln>
-          <a:effectLst/>
-        </p:spPr>
-        <p:style>
-          <a:lnRef idx="1">
-            <a:schemeClr val="accent4"/>
-          </a:lnRef>
-          <a:fillRef idx="2">
-            <a:schemeClr val="accent4"/>
-          </a:fillRef>
-          <a:effectRef idx="1">
-            <a:schemeClr val="accent4"/>
-          </a:effectRef>
-          <a:fontRef idx="minor">
-            <a:schemeClr val="dk1"/>
-          </a:fontRef>
-        </p:style>
-        <p:txBody>
-          <a:bodyPr rtlCol="0" anchor="ctr"/>
-          <a:lstStyle/>
-          <a:p>
-            <a:pPr algn="ctr"/>
-            <a:r>
-              <a:rPr lang="en-US" sz="1050" dirty="0">
-                <a:solidFill>
-                  <a:srgbClr val="7030A0"/>
-                </a:solidFill>
-              </a:rPr>
-              <a:t>&lt;&lt;interface&gt;&gt;</a:t>
-            </a:r>
-            <a:br>
-              <a:rPr lang="en-US" sz="1050" dirty="0">
-                <a:solidFill>
-                  <a:srgbClr val="7030A0"/>
-                </a:solidFill>
-              </a:rPr>
-            </a:br>
-            <a:r>
-              <a:rPr lang="en-US" sz="1050" dirty="0" err="1">
-                <a:solidFill>
-                  <a:srgbClr val="7030A0"/>
-                </a:solidFill>
-              </a:rPr>
-              <a:t>ReadOnlyAddressBook</a:t>
-            </a:r>
-            <a:endParaRPr lang="en-SG" sz="1050" dirty="0">
-              <a:solidFill>
-                <a:srgbClr val="7030A0"/>
-              </a:solidFill>
-            </a:endParaRPr>
-          </a:p>
-        </p:txBody>
-      </p:sp>
-      <p:sp>
-        <p:nvSpPr>
-          <p:cNvPr id="114" name="TextBox 113"/>
-          <p:cNvSpPr txBox="1"/>
-          <p:nvPr/>
-        </p:nvSpPr>
-        <p:spPr>
-          <a:xfrm rot="16200000">
-            <a:off x="6362886" y="3586305"/>
-            <a:ext cx="881018" cy="261610"/>
-          </a:xfrm>
-          <a:prstGeom prst="rect">
-            <a:avLst/>
-          </a:prstGeom>
-          <a:noFill/>
-        </p:spPr>
-        <p:txBody>
-          <a:bodyPr wrap="square" rtlCol="0">
-            <a:spAutoFit/>
-          </a:bodyPr>
-          <a:lstStyle/>
-          <a:p>
-            <a:pPr algn="r"/>
-            <a:r>
-              <a:rPr lang="en-US" sz="1100" dirty="0">
-                <a:solidFill>
-                  <a:srgbClr val="7030A0"/>
-                </a:solidFill>
-              </a:rPr>
-              <a:t>filtered list</a:t>
-            </a:r>
-            <a:endParaRPr lang="en-SG" sz="1100" dirty="0">
-              <a:solidFill>
-                <a:srgbClr val="7030A0"/>
-              </a:solidFill>
-            </a:endParaRPr>
-          </a:p>
-        </p:txBody>
-      </p:sp>
-      <p:sp>
-        <p:nvSpPr>
-          <p:cNvPr id="122" name="Rectangle 8"/>
-          <p:cNvSpPr/>
-          <p:nvPr/>
-        </p:nvSpPr>
-        <p:spPr>
-          <a:xfrm>
-            <a:off x="2057401" y="4239491"/>
-            <a:ext cx="1066800" cy="346760"/>
-          </a:xfrm>
-          <a:prstGeom prst="rect">
-            <a:avLst/>
-          </a:prstGeom>
-          <a:ln w="19050">
-            <a:solidFill>
-              <a:srgbClr val="7030A0"/>
-            </a:solidFill>
-          </a:ln>
-          <a:effectLst/>
-        </p:spPr>
-        <p:style>
-          <a:lnRef idx="1">
-            <a:schemeClr val="accent4"/>
-          </a:lnRef>
-          <a:fillRef idx="2">
-            <a:schemeClr val="accent4"/>
-          </a:fillRef>
-          <a:effectRef idx="1">
-            <a:schemeClr val="accent4"/>
-          </a:effectRef>
-          <a:fontRef idx="minor">
-            <a:schemeClr val="dk1"/>
-          </a:fontRef>
-        </p:style>
-        <p:txBody>
-          <a:bodyPr rtlCol="0" anchor="ctr"/>
-          <a:lstStyle/>
-          <a:p>
-            <a:pPr algn="ctr"/>
-            <a:r>
-              <a:rPr lang="en-US" sz="1050" dirty="0">
-                <a:solidFill>
-                  <a:srgbClr val="7030A0"/>
-                </a:solidFill>
-              </a:rPr>
-              <a:t>&lt;&lt;interface&gt;&gt;</a:t>
-            </a:r>
-            <a:r>
-              <a:rPr lang="en-US" sz="1050">
-                <a:solidFill>
-                  <a:srgbClr val="7030A0"/>
-                </a:solidFill>
-              </a:rPr>
-              <a:t/>
-            </a:r>
-            <a:br>
-              <a:rPr lang="en-US" sz="1050">
-                <a:solidFill>
-                  <a:srgbClr val="7030A0"/>
-                </a:solidFill>
-              </a:rPr>
-            </a:br>
-            <a:r>
-              <a:rPr lang="en-US" sz="1050" dirty="0" err="1">
-                <a:solidFill>
-                  <a:srgbClr val="7030A0"/>
-                </a:solidFill>
-              </a:rPr>
-              <a:t>ObservableList</a:t>
-            </a:r>
-            <a:endParaRPr lang="en-SG" sz="1050" dirty="0">
-              <a:solidFill>
-                <a:srgbClr val="7030A0"/>
-              </a:solidFill>
-            </a:endParaRPr>
-          </a:p>
-        </p:txBody>
-      </p:sp>
-      <p:cxnSp>
-        <p:nvCxnSpPr>
-          <p:cNvPr id="124" name="Elbow Connector 122"/>
-          <p:cNvCxnSpPr>
-            <a:stCxn id="119" idx="1"/>
-            <a:endCxn id="122" idx="1"/>
-          </p:cNvCxnSpPr>
-          <p:nvPr/>
-        </p:nvCxnSpPr>
-        <p:spPr>
-          <a:xfrm rot="16200000" flipH="1">
-            <a:off x="1364475" y="3719944"/>
-            <a:ext cx="831471" cy="554381"/>
-          </a:xfrm>
-          <a:prstGeom prst="bentConnector2">
-            <a:avLst/>
-          </a:prstGeom>
-          <a:ln w="19050">
-            <a:solidFill>
-              <a:srgbClr val="7030A0"/>
-            </a:solidFill>
-            <a:prstDash val="sysDot"/>
-            <a:headEnd type="none" w="med" len="med"/>
-            <a:tailEnd type="arrow" w="med" len="med"/>
           </a:ln>
           <a:effectLst/>
         </p:spPr>
@@ -5095,41 +5388,22 @@
             <a:schemeClr val="dk1"/>
           </a:fontRef>
         </p:style>
-      </p:cxnSp>
-      <p:sp>
-        <p:nvSpPr>
-          <p:cNvPr id="54" name="TextBox 53"/>
-          <p:cNvSpPr txBox="1"/>
-          <p:nvPr/>
-        </p:nvSpPr>
-        <p:spPr>
-          <a:xfrm>
-            <a:off x="4429979" y="3111479"/>
-            <a:ext cx="189257" cy="178683"/>
-          </a:xfrm>
-          <a:prstGeom prst="rect">
-            <a:avLst/>
-          </a:prstGeom>
-          <a:noFill/>
-        </p:spPr>
-        <p:txBody>
-          <a:bodyPr wrap="square" lIns="0" tIns="0" rIns="0" bIns="0" rtlCol="0">
-            <a:noAutofit/>
-          </a:bodyPr>
+        <p:txBody>
+          <a:bodyPr rtlCol="0" anchor="ctr"/>
           <a:lstStyle/>
           <a:p>
             <a:pPr algn="ctr"/>
             <a:r>
-              <a:rPr lang="en-US" sz="1100" dirty="0">
+              <a:rPr lang="en-US" sz="1050" dirty="0" err="1">
                 <a:solidFill>
-                  <a:srgbClr val="7030A0"/>
+                  <a:schemeClr val="bg1"/>
                 </a:solidFill>
               </a:rPr>
-              <a:t>1</a:t>
-            </a:r>
-            <a:endParaRPr lang="en-SG" sz="1100" dirty="0">
+              <a:t>UserProfile</a:t>
+            </a:r>
+            <a:endParaRPr lang="en-SG" sz="1050" dirty="0">
               <a:solidFill>
-                <a:srgbClr val="7030A0"/>
+                <a:schemeClr val="bg1"/>
               </a:solidFill>
             </a:endParaRPr>
           </a:p>
@@ -5137,166 +5411,10 @@
       </p:sp>
       <p:sp>
         <p:nvSpPr>
-          <p:cNvPr id="61" name="TextBox 60"/>
-          <p:cNvSpPr txBox="1"/>
-          <p:nvPr/>
-        </p:nvSpPr>
-        <p:spPr>
-          <a:xfrm>
-            <a:off x="6135256" y="3097917"/>
-            <a:ext cx="189257" cy="178683"/>
-          </a:xfrm>
-          <a:prstGeom prst="rect">
-            <a:avLst/>
-          </a:prstGeom>
-          <a:noFill/>
-        </p:spPr>
-        <p:txBody>
-          <a:bodyPr wrap="square" lIns="0" tIns="0" rIns="0" bIns="0" rtlCol="0">
-            <a:noAutofit/>
-          </a:bodyPr>
-          <a:lstStyle/>
-          <a:p>
-            <a:pPr algn="ctr"/>
-            <a:r>
-              <a:rPr lang="en-US" sz="1100" dirty="0">
-                <a:solidFill>
-                  <a:srgbClr val="7030A0"/>
-                </a:solidFill>
-              </a:rPr>
-              <a:t>*</a:t>
-            </a:r>
-            <a:endParaRPr lang="en-SG" sz="1100" dirty="0">
-              <a:solidFill>
-                <a:srgbClr val="7030A0"/>
-              </a:solidFill>
-            </a:endParaRPr>
-          </a:p>
-        </p:txBody>
-      </p:sp>
-      <p:sp>
-        <p:nvSpPr>
-          <p:cNvPr id="65" name="TextBox 64"/>
-          <p:cNvSpPr txBox="1"/>
-          <p:nvPr/>
-        </p:nvSpPr>
-        <p:spPr>
-          <a:xfrm>
-            <a:off x="2573394" y="2756715"/>
-            <a:ext cx="170110" cy="137542"/>
-          </a:xfrm>
-          <a:prstGeom prst="rect">
-            <a:avLst/>
-          </a:prstGeom>
-          <a:noFill/>
-        </p:spPr>
-        <p:txBody>
-          <a:bodyPr wrap="square" lIns="0" tIns="0" rIns="0" bIns="0" rtlCol="0">
-            <a:noAutofit/>
-          </a:bodyPr>
-          <a:lstStyle/>
-          <a:p>
-            <a:pPr algn="ctr"/>
-            <a:r>
-              <a:rPr lang="en-US" sz="1100" dirty="0">
-                <a:solidFill>
-                  <a:srgbClr val="7030A0"/>
-                </a:solidFill>
-              </a:rPr>
-              <a:t>1</a:t>
-            </a:r>
-            <a:endParaRPr lang="en-SG" sz="1100" dirty="0">
-              <a:solidFill>
-                <a:srgbClr val="7030A0"/>
-              </a:solidFill>
-            </a:endParaRPr>
-          </a:p>
-        </p:txBody>
-      </p:sp>
-      <p:sp>
-        <p:nvSpPr>
-          <p:cNvPr id="66" name="TextBox 65"/>
-          <p:cNvSpPr txBox="1"/>
-          <p:nvPr/>
-        </p:nvSpPr>
-        <p:spPr>
-          <a:xfrm>
-            <a:off x="2707070" y="3667737"/>
-            <a:ext cx="189257" cy="178683"/>
-          </a:xfrm>
-          <a:prstGeom prst="rect">
-            <a:avLst/>
-          </a:prstGeom>
-          <a:noFill/>
-        </p:spPr>
-        <p:txBody>
-          <a:bodyPr wrap="square" lIns="0" tIns="0" rIns="0" bIns="0" rtlCol="0">
-            <a:noAutofit/>
-          </a:bodyPr>
-          <a:lstStyle/>
-          <a:p>
-            <a:pPr algn="ctr"/>
-            <a:r>
-              <a:rPr lang="en-US" sz="1100" dirty="0">
-                <a:solidFill>
-                  <a:srgbClr val="7030A0"/>
-                </a:solidFill>
-              </a:rPr>
-              <a:t>1</a:t>
-            </a:r>
-            <a:endParaRPr lang="en-SG" sz="1100" dirty="0">
-              <a:solidFill>
-                <a:srgbClr val="7030A0"/>
-              </a:solidFill>
-            </a:endParaRPr>
-          </a:p>
-        </p:txBody>
-      </p:sp>
-      <p:sp>
-        <p:nvSpPr>
-          <p:cNvPr id="70" name="TextBox 69"/>
-          <p:cNvSpPr txBox="1"/>
-          <p:nvPr/>
-        </p:nvSpPr>
-        <p:spPr>
-          <a:xfrm>
-            <a:off x="6449896" y="3204826"/>
-            <a:ext cx="189257" cy="178683"/>
-          </a:xfrm>
-          <a:prstGeom prst="rect">
-            <a:avLst/>
-          </a:prstGeom>
-          <a:noFill/>
-        </p:spPr>
-        <p:txBody>
-          <a:bodyPr wrap="square" lIns="0" tIns="0" rIns="0" bIns="0" rtlCol="0">
-            <a:noAutofit/>
-          </a:bodyPr>
-          <a:lstStyle/>
-          <a:p>
-            <a:pPr algn="ctr"/>
-            <a:r>
-              <a:rPr lang="en-US" sz="1100" dirty="0">
-                <a:solidFill>
-                  <a:srgbClr val="7030A0"/>
-                </a:solidFill>
-              </a:rPr>
-              <a:t>1</a:t>
-            </a:r>
-            <a:endParaRPr lang="en-SG" sz="1100" dirty="0">
-              <a:solidFill>
-                <a:srgbClr val="7030A0"/>
-              </a:solidFill>
-            </a:endParaRPr>
-          </a:p>
-        </p:txBody>
-      </p:sp>
-      <p:sp>
-        <p:nvSpPr>
-          <p:cNvPr id="52" name="Rectangle 8">
+          <p:cNvPr id="72" name="Flowchart: Decision 96">
             <a:extLst>
               <a:ext uri="{FF2B5EF4-FFF2-40B4-BE49-F238E27FC236}">
-                <a16:creationId xmlns:a16="http://schemas.microsoft.com/office/drawing/2014/main" id="{ABDCDBD2-131A-4B66-A2F2-43BBEE82C773}"/>
+                <a16:creationId xmlns:a16="http://schemas.microsoft.com/office/drawing/2014/main" id="{DF40CDD4-99DC-1543-9EC8-EB5288E689AB}"/>
               </a:ext>
             </a:extLst>
           </p:cNvPr>
@@ -5305,267 +5423,14 @@
         </p:nvSpPr>
         <p:spPr>
           <a:xfrm>
-            <a:off x="7712397" y="2228817"/>
-            <a:ext cx="708186" cy="285783"/>
-          </a:xfrm>
-          <a:prstGeom prst="rect">
+            <a:off x="2326533" y="3998018"/>
+            <a:ext cx="236048" cy="173380"/>
+          </a:xfrm>
+          <a:prstGeom prst="flowChartDecision">
             <a:avLst/>
           </a:prstGeom>
-          <a:ln w="19050">
-            <a:solidFill>
-              <a:srgbClr val="7030A0"/>
-            </a:solidFill>
-          </a:ln>
-          <a:effectLst/>
-        </p:spPr>
-        <p:style>
-          <a:lnRef idx="1">
-            <a:schemeClr val="accent4"/>
-          </a:lnRef>
-          <a:fillRef idx="2">
-            <a:schemeClr val="accent4"/>
-          </a:fillRef>
-          <a:effectRef idx="1">
-            <a:schemeClr val="accent4"/>
-          </a:effectRef>
-          <a:fontRef idx="minor">
-            <a:schemeClr val="dk1"/>
-          </a:fontRef>
-        </p:style>
-        <p:txBody>
-          <a:bodyPr rtlCol="0" anchor="ctr"/>
-          <a:lstStyle/>
-          <a:p>
-            <a:pPr algn="ctr"/>
-            <a:r>
-              <a:rPr lang="en-US" sz="1050" dirty="0">
-                <a:solidFill>
-                  <a:srgbClr val="7030A0"/>
-                </a:solidFill>
-              </a:rPr>
-              <a:t>Tag</a:t>
-            </a:r>
-            <a:endParaRPr lang="en-SG" sz="1050" dirty="0">
-              <a:solidFill>
-                <a:srgbClr val="7030A0"/>
-              </a:solidFill>
-            </a:endParaRPr>
-          </a:p>
-        </p:txBody>
-      </p:sp>
-      <p:cxnSp>
-        <p:nvCxnSpPr>
-          <p:cNvPr id="53" name="Elbow Connector 78">
-            <a:extLst>
-              <a:ext uri="{FF2B5EF4-FFF2-40B4-BE49-F238E27FC236}">
-                <a16:creationId xmlns:a16="http://schemas.microsoft.com/office/drawing/2014/main" id="{B97967F8-618A-448B-81FD-CDFD4AF0EC64}"/>
-              </a:ext>
-            </a:extLst>
-          </p:cNvPr>
-          <p:cNvCxnSpPr>
-            <a:cxnSpLocks/>
-            <a:stCxn id="78" idx="3"/>
-            <a:endCxn id="52" idx="1"/>
-          </p:cNvCxnSpPr>
-          <p:nvPr/>
-        </p:nvCxnSpPr>
-        <p:spPr>
-          <a:xfrm flipV="1">
-            <a:off x="7277995" y="2371709"/>
-            <a:ext cx="434402" cy="663182"/>
-          </a:xfrm>
-          <a:prstGeom prst="bentConnector3">
-            <a:avLst>
-              <a:gd name="adj1" fmla="val 50000"/>
-            </a:avLst>
-          </a:prstGeom>
-          <a:ln w="19050">
-            <a:solidFill>
-              <a:srgbClr val="7030A0"/>
-            </a:solidFill>
-            <a:headEnd type="none" w="med" len="med"/>
-            <a:tailEnd type="arrow" w="med" len="med"/>
-          </a:ln>
-          <a:effectLst/>
-        </p:spPr>
-        <p:style>
-          <a:lnRef idx="1">
-            <a:schemeClr val="accent2"/>
-          </a:lnRef>
-          <a:fillRef idx="2">
-            <a:schemeClr val="accent2"/>
-          </a:fillRef>
-          <a:effectRef idx="1">
-            <a:schemeClr val="accent2"/>
-          </a:effectRef>
-          <a:fontRef idx="minor">
-            <a:schemeClr val="dk1"/>
-          </a:fontRef>
-        </p:style>
-      </p:cxnSp>
-      <p:sp>
-        <p:nvSpPr>
-          <p:cNvPr id="50" name="TextBox 49">
-            <a:extLst>
-              <a:ext uri="{FF2B5EF4-FFF2-40B4-BE49-F238E27FC236}">
-                <a16:creationId xmlns:a16="http://schemas.microsoft.com/office/drawing/2014/main" id="{B3FA9D57-880F-49C4-AD0B-A64E30D6F403}"/>
-              </a:ext>
-            </a:extLst>
-          </p:cNvPr>
-          <p:cNvSpPr txBox="1"/>
-          <p:nvPr/>
-        </p:nvSpPr>
-        <p:spPr>
-          <a:xfrm>
-            <a:off x="7466243" y="2255711"/>
-            <a:ext cx="189257" cy="178683"/>
-          </a:xfrm>
-          <a:prstGeom prst="rect">
-            <a:avLst/>
-          </a:prstGeom>
-          <a:noFill/>
-        </p:spPr>
-        <p:txBody>
-          <a:bodyPr wrap="square" lIns="0" tIns="0" rIns="0" bIns="0" rtlCol="0">
-            <a:noAutofit/>
-          </a:bodyPr>
-          <a:lstStyle/>
-          <a:p>
-            <a:pPr algn="ctr"/>
-            <a:r>
-              <a:rPr lang="en-US" sz="1100" dirty="0">
-                <a:solidFill>
-                  <a:srgbClr val="7030A0"/>
-                </a:solidFill>
-              </a:rPr>
-              <a:t>*</a:t>
-            </a:r>
-            <a:endParaRPr lang="en-SG" sz="1100" dirty="0">
-              <a:solidFill>
-                <a:srgbClr val="7030A0"/>
-              </a:solidFill>
-            </a:endParaRPr>
-          </a:p>
-        </p:txBody>
-      </p:sp>
-      <p:sp>
-        <p:nvSpPr>
-          <p:cNvPr id="55" name="Rectangle 8"/>
-          <p:cNvSpPr/>
-          <p:nvPr/>
-        </p:nvSpPr>
-        <p:spPr>
-          <a:xfrm>
-            <a:off x="3170181" y="1998350"/>
-            <a:ext cx="1060683" cy="364396"/>
-          </a:xfrm>
-          <a:prstGeom prst="rect">
-            <a:avLst/>
-          </a:prstGeom>
-          <a:ln w="19050">
-            <a:solidFill>
-              <a:srgbClr val="7030A0"/>
-            </a:solidFill>
-          </a:ln>
-          <a:effectLst/>
-        </p:spPr>
-        <p:style>
-          <a:lnRef idx="1">
-            <a:schemeClr val="accent4"/>
-          </a:lnRef>
-          <a:fillRef idx="2">
-            <a:schemeClr val="accent4"/>
-          </a:fillRef>
-          <a:effectRef idx="1">
-            <a:schemeClr val="accent4"/>
-          </a:effectRef>
-          <a:fontRef idx="minor">
-            <a:schemeClr val="dk1"/>
-          </a:fontRef>
-        </p:style>
-        <p:txBody>
-          <a:bodyPr rtlCol="0" anchor="ctr"/>
-          <a:lstStyle/>
-          <a:p>
-            <a:pPr algn="ctr"/>
-            <a:r>
-              <a:rPr lang="en-US" sz="1050" dirty="0" err="1">
-                <a:solidFill>
-                  <a:srgbClr val="7030A0"/>
-                </a:solidFill>
-              </a:rPr>
-              <a:t>AddressBook</a:t>
-            </a:r>
-            <a:endParaRPr lang="en-SG" sz="1050" dirty="0">
-              <a:solidFill>
-                <a:srgbClr val="7030A0"/>
-              </a:solidFill>
-            </a:endParaRPr>
-          </a:p>
-        </p:txBody>
-      </p:sp>
-      <p:cxnSp>
-        <p:nvCxnSpPr>
-          <p:cNvPr id="60" name="Straight Arrow Connector 59"/>
-          <p:cNvCxnSpPr>
-            <a:stCxn id="51" idx="1"/>
-            <a:endCxn id="49" idx="1"/>
-          </p:cNvCxnSpPr>
-          <p:nvPr/>
-        </p:nvCxnSpPr>
-        <p:spPr>
-          <a:xfrm>
-            <a:off x="4324972" y="3007222"/>
-            <a:ext cx="367678" cy="12320"/>
-          </a:xfrm>
-          <a:prstGeom prst="straightConnector1">
-            <a:avLst/>
-          </a:prstGeom>
-          <a:ln w="19050">
-            <a:solidFill>
-              <a:srgbClr val="7030A0"/>
-            </a:solidFill>
-            <a:headEnd type="none" w="med" len="med"/>
-            <a:tailEnd type="arrow" w="med" len="med"/>
-          </a:ln>
-          <a:effectLst/>
-        </p:spPr>
-        <p:style>
-          <a:lnRef idx="1">
-            <a:schemeClr val="accent2"/>
-          </a:lnRef>
-          <a:fillRef idx="2">
-            <a:schemeClr val="accent2"/>
-          </a:fillRef>
-          <a:effectRef idx="1">
-            <a:schemeClr val="accent2"/>
-          </a:effectRef>
-          <a:fontRef idx="minor">
-            <a:schemeClr val="dk1"/>
-          </a:fontRef>
-        </p:style>
-      </p:cxnSp>
-      <p:sp>
-        <p:nvSpPr>
-          <p:cNvPr id="68" name="Isosceles Triangle 102"/>
-          <p:cNvSpPr/>
-          <p:nvPr/>
-        </p:nvSpPr>
-        <p:spPr>
-          <a:xfrm rot="16200000">
-            <a:off x="2669073" y="2069158"/>
-            <a:ext cx="271014" cy="187417"/>
-          </a:xfrm>
-          <a:prstGeom prst="triangle">
-            <a:avLst>
-              <a:gd name="adj" fmla="val 44517"/>
-            </a:avLst>
-          </a:prstGeom>
           <a:solidFill>
-            <a:schemeClr val="accent4">
-              <a:lumMod val="20000"/>
-              <a:lumOff val="80000"/>
-            </a:schemeClr>
+            <a:srgbClr val="7030A0"/>
           </a:solidFill>
           <a:ln w="19050">
             <a:solidFill>
@@ -5593,54 +5458,55 @@
           <a:lstStyle/>
           <a:p>
             <a:pPr algn="ctr"/>
-            <a:endParaRPr lang="en-SG" sz="1050"/>
-          </a:p>
-        </p:txBody>
-      </p:sp>
-      <p:cxnSp>
-        <p:nvCxnSpPr>
-          <p:cNvPr id="69" name="Elbow Connector 63"/>
-          <p:cNvCxnSpPr>
-            <a:stCxn id="68" idx="3"/>
-            <a:endCxn id="55" idx="1"/>
-          </p:cNvCxnSpPr>
+            <a:endParaRPr lang="en-US" sz="1050"/>
+          </a:p>
+        </p:txBody>
+      </p:sp>
+      <p:sp>
+        <p:nvSpPr>
+          <p:cNvPr id="74" name="TextBox 73">
+            <a:extLst>
+              <a:ext uri="{FF2B5EF4-FFF2-40B4-BE49-F238E27FC236}">
+                <a16:creationId xmlns:a16="http://schemas.microsoft.com/office/drawing/2014/main" id="{F4A8837F-9FD6-E44F-8EA1-FA5FCC4D8096}"/>
+              </a:ext>
+            </a:extLst>
+          </p:cNvPr>
+          <p:cNvSpPr txBox="1"/>
           <p:nvPr/>
-        </p:nvCxnSpPr>
+        </p:nvSpPr>
         <p:spPr>
           <a:xfrm>
-            <a:off x="2898289" y="2177727"/>
-            <a:ext cx="271892" cy="2821"/>
-          </a:xfrm>
-          <a:prstGeom prst="bentConnector3">
-            <a:avLst>
-              <a:gd name="adj1" fmla="val 50000"/>
-            </a:avLst>
+            <a:off x="2567323" y="3961307"/>
+            <a:ext cx="189257" cy="178683"/>
+          </a:xfrm>
+          <a:prstGeom prst="rect">
+            <a:avLst/>
           </a:prstGeom>
-          <a:ln w="19050">
-            <a:solidFill>
-              <a:srgbClr val="7030A0"/>
-            </a:solidFill>
-            <a:prstDash val="sysDot"/>
-            <a:headEnd type="none" w="med" len="med"/>
-            <a:tailEnd type="none" w="med" len="med"/>
-          </a:ln>
-          <a:effectLst/>
-        </p:spPr>
-        <p:style>
-          <a:lnRef idx="1">
-            <a:schemeClr val="accent2"/>
-          </a:lnRef>
-          <a:fillRef idx="2">
-            <a:schemeClr val="accent2"/>
-          </a:fillRef>
-          <a:effectRef idx="1">
-            <a:schemeClr val="accent2"/>
-          </a:effectRef>
-          <a:fontRef idx="minor">
-            <a:schemeClr val="dk1"/>
-          </a:fontRef>
-        </p:style>
-      </p:cxnSp>
+          <a:noFill/>
+        </p:spPr>
+        <p:txBody>
+          <a:bodyPr wrap="square" lIns="0" tIns="0" rIns="0" bIns="0" rtlCol="0">
+            <a:noAutofit/>
+          </a:bodyPr>
+          <a:lstStyle/>
+          <a:p>
+            <a:pPr algn="ctr"/>
+            <a:r>
+              <a:rPr lang="en-US" sz="1100" dirty="0">
+                <a:solidFill>
+                  <a:srgbClr val="7030A0"/>
+                </a:solidFill>
+              </a:rPr>
+              <a:t>1</a:t>
+            </a:r>
+            <a:endParaRPr lang="en-SG" sz="1100" dirty="0">
+              <a:solidFill>
+                <a:srgbClr val="7030A0"/>
+              </a:solidFill>
+            </a:endParaRPr>
+          </a:p>
+        </p:txBody>
+      </p:sp>
     </p:spTree>
     <p:extLst>
       <p:ext uri="{BB962C8B-B14F-4D97-AF65-F5344CB8AC3E}">

</xml_diff>

<commit_message>
Update model UML and storage UML
</commit_message>
<xml_diff>
--- a/docs/diagrams/ModelComponentClassDiagram.pptx
+++ b/docs/diagrams/ModelComponentClassDiagram.pptx
@@ -208,7 +208,7 @@
           <a:p>
             <a:fld id="{F5CC4B3F-88C1-4FFA-B1B6-F41C21DC6924}" type="datetimeFigureOut">
               <a:rPr lang="en-US" smtClean="0"/>
-              <a:t>10/30/18</a:t>
+              <a:t>11/10/2018</a:t>
             </a:fld>
             <a:endParaRPr lang="en-US"/>
           </a:p>
@@ -654,7 +654,7 @@
           <a:p>
             <a:fld id="{78C97017-6FC3-485B-9764-EAC9E56C1D49}" type="datetimeFigureOut">
               <a:rPr lang="en-US" smtClean="0"/>
-              <a:t>10/30/18</a:t>
+              <a:t>11/10/2018</a:t>
             </a:fld>
             <a:endParaRPr lang="en-US"/>
           </a:p>
@@ -822,7 +822,7 @@
           <a:p>
             <a:fld id="{78C97017-6FC3-485B-9764-EAC9E56C1D49}" type="datetimeFigureOut">
               <a:rPr lang="en-US" smtClean="0"/>
-              <a:t>10/30/18</a:t>
+              <a:t>11/10/2018</a:t>
             </a:fld>
             <a:endParaRPr lang="en-US"/>
           </a:p>
@@ -1000,7 +1000,7 @@
           <a:p>
             <a:fld id="{78C97017-6FC3-485B-9764-EAC9E56C1D49}" type="datetimeFigureOut">
               <a:rPr lang="en-US" smtClean="0"/>
-              <a:t>10/30/18</a:t>
+              <a:t>11/10/2018</a:t>
             </a:fld>
             <a:endParaRPr lang="en-US"/>
           </a:p>
@@ -1168,7 +1168,7 @@
           <a:p>
             <a:fld id="{78C97017-6FC3-485B-9764-EAC9E56C1D49}" type="datetimeFigureOut">
               <a:rPr lang="en-US" smtClean="0"/>
-              <a:t>10/30/18</a:t>
+              <a:t>11/10/2018</a:t>
             </a:fld>
             <a:endParaRPr lang="en-US"/>
           </a:p>
@@ -1413,7 +1413,7 @@
           <a:p>
             <a:fld id="{78C97017-6FC3-485B-9764-EAC9E56C1D49}" type="datetimeFigureOut">
               <a:rPr lang="en-US" smtClean="0"/>
-              <a:t>10/30/18</a:t>
+              <a:t>11/10/2018</a:t>
             </a:fld>
             <a:endParaRPr lang="en-US"/>
           </a:p>
@@ -1698,7 +1698,7 @@
           <a:p>
             <a:fld id="{78C97017-6FC3-485B-9764-EAC9E56C1D49}" type="datetimeFigureOut">
               <a:rPr lang="en-US" smtClean="0"/>
-              <a:t>10/30/18</a:t>
+              <a:t>11/10/2018</a:t>
             </a:fld>
             <a:endParaRPr lang="en-US"/>
           </a:p>
@@ -2117,7 +2117,7 @@
           <a:p>
             <a:fld id="{78C97017-6FC3-485B-9764-EAC9E56C1D49}" type="datetimeFigureOut">
               <a:rPr lang="en-US" smtClean="0"/>
-              <a:t>10/30/18</a:t>
+              <a:t>11/10/2018</a:t>
             </a:fld>
             <a:endParaRPr lang="en-US"/>
           </a:p>
@@ -2234,7 +2234,7 @@
           <a:p>
             <a:fld id="{78C97017-6FC3-485B-9764-EAC9E56C1D49}" type="datetimeFigureOut">
               <a:rPr lang="en-US" smtClean="0"/>
-              <a:t>10/30/18</a:t>
+              <a:t>11/10/2018</a:t>
             </a:fld>
             <a:endParaRPr lang="en-US"/>
           </a:p>
@@ -2329,7 +2329,7 @@
           <a:p>
             <a:fld id="{78C97017-6FC3-485B-9764-EAC9E56C1D49}" type="datetimeFigureOut">
               <a:rPr lang="en-US" smtClean="0"/>
-              <a:t>10/30/18</a:t>
+              <a:t>11/10/2018</a:t>
             </a:fld>
             <a:endParaRPr lang="en-US"/>
           </a:p>
@@ -2604,7 +2604,7 @@
           <a:p>
             <a:fld id="{78C97017-6FC3-485B-9764-EAC9E56C1D49}" type="datetimeFigureOut">
               <a:rPr lang="en-US" smtClean="0"/>
-              <a:t>10/30/18</a:t>
+              <a:t>11/10/2018</a:t>
             </a:fld>
             <a:endParaRPr lang="en-US"/>
           </a:p>
@@ -2856,7 +2856,7 @@
           <a:p>
             <a:fld id="{78C97017-6FC3-485B-9764-EAC9E56C1D49}" type="datetimeFigureOut">
               <a:rPr lang="en-US" smtClean="0"/>
-              <a:t>10/30/18</a:t>
+              <a:t>11/10/2018</a:t>
             </a:fld>
             <a:endParaRPr lang="en-US"/>
           </a:p>
@@ -3067,7 +3067,7 @@
           <a:p>
             <a:fld id="{78C97017-6FC3-485B-9764-EAC9E56C1D49}" type="datetimeFigureOut">
               <a:rPr lang="en-US" smtClean="0"/>
-              <a:t>10/30/18</a:t>
+              <a:t>11/10/2018</a:t>
             </a:fld>
             <a:endParaRPr lang="en-US"/>
           </a:p>
@@ -3450,7 +3450,7 @@
         </p:nvSpPr>
         <p:spPr>
           <a:xfrm>
-            <a:off x="990600" y="1600200"/>
+            <a:off x="1018021" y="1597502"/>
             <a:ext cx="7848599" cy="4114800"/>
           </a:xfrm>
           <a:prstGeom prst="roundRect">
@@ -3511,7 +3511,7 @@
         </p:nvSpPr>
         <p:spPr>
           <a:xfrm>
-            <a:off x="3402165" y="3387040"/>
+            <a:off x="3270868" y="3878069"/>
             <a:ext cx="1093635" cy="346760"/>
           </a:xfrm>
           <a:prstGeom prst="rect">
@@ -3788,14 +3788,12 @@
           <p:cNvPr id="58" name="Straight Arrow Connector 57"/>
           <p:cNvCxnSpPr>
             <a:cxnSpLocks/>
-            <a:stCxn id="42" idx="3"/>
-            <a:endCxn id="2" idx="1"/>
           </p:cNvCxnSpPr>
           <p:nvPr/>
         </p:nvCxnSpPr>
         <p:spPr>
           <a:xfrm>
-            <a:off x="2555513" y="3555765"/>
+            <a:off x="2479579" y="4046794"/>
             <a:ext cx="846652" cy="4655"/>
           </a:xfrm>
           <a:prstGeom prst="straightConnector1">
@@ -3919,7 +3917,7 @@
         </p:nvSpPr>
         <p:spPr>
           <a:xfrm>
-            <a:off x="2319465" y="3428999"/>
+            <a:off x="2309855" y="3896574"/>
             <a:ext cx="236048" cy="253532"/>
           </a:xfrm>
           <a:prstGeom prst="flowChartDecision">
@@ -4992,7 +4990,7 @@
         </p:nvSpPr>
         <p:spPr>
           <a:xfrm>
-            <a:off x="2571096" y="3355477"/>
+            <a:off x="3639308" y="3492545"/>
             <a:ext cx="189257" cy="178683"/>
           </a:xfrm>
           <a:prstGeom prst="rect">
@@ -5305,20 +5303,17 @@
           </p:cNvPr>
           <p:cNvCxnSpPr>
             <a:cxnSpLocks/>
-            <a:stCxn id="72" idx="3"/>
-            <a:endCxn id="67" idx="1"/>
+            <a:stCxn id="72" idx="2"/>
           </p:cNvCxnSpPr>
           <p:nvPr/>
         </p:nvCxnSpPr>
         <p:spPr>
-          <a:xfrm>
-            <a:off x="2562581" y="4084708"/>
-            <a:ext cx="839584" cy="3950"/>
-          </a:xfrm>
-          <a:prstGeom prst="bentConnector3">
-            <a:avLst>
-              <a:gd name="adj1" fmla="val 50000"/>
-            </a:avLst>
+          <a:xfrm rot="16200000" flipH="1">
+            <a:off x="3504162" y="3310379"/>
+            <a:ext cx="283110" cy="405936"/>
+          </a:xfrm>
+          <a:prstGeom prst="bentConnector2">
+            <a:avLst/>
           </a:prstGeom>
           <a:ln w="19050">
             <a:solidFill>
@@ -5358,7 +5353,7 @@
         </p:nvSpPr>
         <p:spPr>
           <a:xfrm>
-            <a:off x="3402165" y="3915278"/>
+            <a:off x="3848686" y="3440724"/>
             <a:ext cx="1093635" cy="346760"/>
           </a:xfrm>
           <a:prstGeom prst="rect">
@@ -5423,7 +5418,7 @@
         </p:nvSpPr>
         <p:spPr>
           <a:xfrm>
-            <a:off x="2326533" y="3998018"/>
+            <a:off x="3324725" y="3198412"/>
             <a:ext cx="236048" cy="173380"/>
           </a:xfrm>
           <a:prstGeom prst="flowChartDecision">
@@ -5475,9 +5470,9 @@
           <p:nvPr/>
         </p:nvSpPr>
         <p:spPr>
-          <a:xfrm>
-            <a:off x="2567323" y="3961307"/>
-            <a:ext cx="189257" cy="178683"/>
+          <a:xfrm flipH="1">
+            <a:off x="3170182" y="4201670"/>
+            <a:ext cx="88352" cy="598634"/>
           </a:xfrm>
           <a:prstGeom prst="rect">
             <a:avLst/>

</xml_diff>